<commit_message>
10/29/2017 - Save presentation file in Repo
</commit_message>
<xml_diff>
--- a/Presentations/Week7.pptx
+++ b/Presentations/Week7.pptx
@@ -311,7 +311,7 @@
           <a:p>
             <a:fld id="{30912005-9035-7D42-9D0A-D7294749B3B2}" type="datetimeFigureOut">
               <a:rPr lang="en-US" smtClean="0"/>
-              <a:t>10/24/17</a:t>
+              <a:t>10/29/2017</a:t>
             </a:fld>
             <a:endParaRPr lang="en-US"/>
           </a:p>
@@ -714,7 +714,7 @@
             <a:fld id="{3BAB58DD-9525-F540-8996-805078074904}" type="datetimeFigureOut">
               <a:rPr lang="en-US" smtClean="0"/>
               <a:pPr/>
-              <a:t>10/24/17</a:t>
+              <a:t>10/29/2017</a:t>
             </a:fld>
             <a:endParaRPr lang="en-US"/>
           </a:p>
@@ -1033,7 +1033,7 @@
             <a:fld id="{3BAB58DD-9525-F540-8996-805078074904}" type="datetimeFigureOut">
               <a:rPr lang="en-US" smtClean="0"/>
               <a:pPr/>
-              <a:t>10/24/17</a:t>
+              <a:t>10/29/2017</a:t>
             </a:fld>
             <a:endParaRPr lang="en-US"/>
           </a:p>
@@ -1220,7 +1220,7 @@
             <a:fld id="{3BAB58DD-9525-F540-8996-805078074904}" type="datetimeFigureOut">
               <a:rPr lang="en-US" smtClean="0"/>
               <a:pPr/>
-              <a:t>10/24/17</a:t>
+              <a:t>10/29/2017</a:t>
             </a:fld>
             <a:endParaRPr lang="en-US"/>
           </a:p>
@@ -1397,7 +1397,7 @@
             <a:fld id="{3BAB58DD-9525-F540-8996-805078074904}" type="datetimeFigureOut">
               <a:rPr lang="en-US" smtClean="0"/>
               <a:pPr/>
-              <a:t>10/24/17</a:t>
+              <a:t>10/29/2017</a:t>
             </a:fld>
             <a:endParaRPr lang="en-US"/>
           </a:p>
@@ -1669,7 +1669,7 @@
             <a:fld id="{3BAB58DD-9525-F540-8996-805078074904}" type="datetimeFigureOut">
               <a:rPr lang="en-US" smtClean="0"/>
               <a:pPr/>
-              <a:t>10/24/17</a:t>
+              <a:t>10/29/2017</a:t>
             </a:fld>
             <a:endParaRPr lang="en-US"/>
           </a:p>
@@ -2145,7 +2145,7 @@
             <a:fld id="{3BAB58DD-9525-F540-8996-805078074904}" type="datetimeFigureOut">
               <a:rPr lang="en-US" smtClean="0"/>
               <a:pPr/>
-              <a:t>10/24/17</a:t>
+              <a:t>10/29/2017</a:t>
             </a:fld>
             <a:endParaRPr lang="en-US"/>
           </a:p>
@@ -2636,7 +2636,7 @@
             <a:fld id="{3BAB58DD-9525-F540-8996-805078074904}" type="datetimeFigureOut">
               <a:rPr lang="en-US" smtClean="0"/>
               <a:pPr/>
-              <a:t>10/24/17</a:t>
+              <a:t>10/29/2017</a:t>
             </a:fld>
             <a:endParaRPr lang="en-US"/>
           </a:p>
@@ -2764,7 +2764,7 @@
             <a:fld id="{3BAB58DD-9525-F540-8996-805078074904}" type="datetimeFigureOut">
               <a:rPr lang="en-US" smtClean="0"/>
               <a:pPr/>
-              <a:t>10/24/17</a:t>
+              <a:t>10/29/2017</a:t>
             </a:fld>
             <a:endParaRPr lang="en-US"/>
           </a:p>
@@ -2912,7 +2912,7 @@
             <a:fld id="{3BAB58DD-9525-F540-8996-805078074904}" type="datetimeFigureOut">
               <a:rPr lang="en-US" smtClean="0"/>
               <a:pPr/>
-              <a:t>10/24/17</a:t>
+              <a:t>10/29/2017</a:t>
             </a:fld>
             <a:endParaRPr lang="en-US"/>
           </a:p>
@@ -3238,7 +3238,7 @@
             <a:fld id="{3BAB58DD-9525-F540-8996-805078074904}" type="datetimeFigureOut">
               <a:rPr lang="en-US" smtClean="0"/>
               <a:pPr/>
-              <a:t>10/24/17</a:t>
+              <a:t>10/29/2017</a:t>
             </a:fld>
             <a:endParaRPr lang="en-US"/>
           </a:p>
@@ -3374,7 +3374,7 @@
             <a:fld id="{3BAB58DD-9525-F540-8996-805078074904}" type="datetimeFigureOut">
               <a:rPr lang="en-US" smtClean="0"/>
               <a:pPr/>
-              <a:t>10/24/17</a:t>
+              <a:t>10/29/2017</a:t>
             </a:fld>
             <a:endParaRPr lang="en-US"/>
           </a:p>
@@ -4170,7 +4170,7 @@
             <a:fld id="{3BAB58DD-9525-F540-8996-805078074904}" type="datetimeFigureOut">
               <a:rPr lang="en-US" smtClean="0"/>
               <a:pPr/>
-              <a:t>10/24/17</a:t>
+              <a:t>10/29/2017</a:t>
             </a:fld>
             <a:endParaRPr lang="en-US" dirty="0"/>
           </a:p>
@@ -4717,11 +4717,7 @@
           <a:p>
             <a:r>
               <a:rPr lang="en-US" dirty="0" smtClean="0"/>
-              <a:t>Week#7, </a:t>
-            </a:r>
-            <a:r>
-              <a:rPr lang="en-US" dirty="0" smtClean="0"/>
-              <a:t>10/25/2017</a:t>
+              <a:t>Week#7, 10/25/2017</a:t>
             </a:r>
             <a:endParaRPr lang="en-US" dirty="0"/>
           </a:p>
@@ -6709,10 +6705,6 @@
               </a:rPr>
               <a:t>(["A first line.\n", "A second line.\n"]) </a:t>
             </a:r>
-            <a:endParaRPr lang="en-US" dirty="0">
-              <a:latin typeface="Courier"/>
-              <a:cs typeface="Courier"/>
-            </a:endParaRPr>
           </a:p>
           <a:p>
             <a:pPr marL="82296" indent="0">
@@ -6866,13 +6858,7 @@
               <a:rPr lang="en-US" sz="3800" dirty="0" smtClean="0">
                 <a:cs typeface="Courier"/>
               </a:rPr>
-              <a:t>The </a:t>
-            </a:r>
-            <a:r>
-              <a:rPr lang="en-US" sz="3800" dirty="0" smtClean="0">
-                <a:cs typeface="Courier"/>
-              </a:rPr>
-              <a:t>redirected ports can be restored to their original values using sys.__</a:t>
+              <a:t>The redirected ports can be restored to their original values using sys.__</a:t>
             </a:r>
             <a:r>
               <a:rPr lang="en-US" sz="3800" dirty="0" err="1" smtClean="0">
@@ -7604,10 +7590,6 @@
               </a:rPr>
               <a:t>file=f) </a:t>
             </a:r>
-            <a:endParaRPr lang="en-US" dirty="0" smtClean="0">
-              <a:latin typeface="Courier"/>
-              <a:cs typeface="Courier"/>
-            </a:endParaRPr>
           </a:p>
           <a:p>
             <a:pPr marL="82296" indent="0">
@@ -14991,11 +14973,11 @@
   <p:clrMapOvr>
     <a:masterClrMapping/>
   </p:clrMapOvr>
-  <mc:AlternateContent xmlns:mc="http://schemas.openxmlformats.org/markup-compatibility/2006">
-    <mc:Choice xmlns:p14="http://schemas.microsoft.com/office/powerpoint/2010/main" Requires="p14">
+  <mc:AlternateContent xmlns:mc="http://schemas.openxmlformats.org/markup-compatibility/2006" xmlns:p14="http://schemas.microsoft.com/office/powerpoint/2010/main">
+    <mc:Choice Requires="p14">
       <p:transition spd="slow" p14:dur="2000"/>
     </mc:Choice>
-    <mc:Fallback>
+    <mc:Fallback xmlns="">
       <p:transition spd="slow"/>
     </mc:Fallback>
   </mc:AlternateContent>
@@ -15095,11 +15077,11 @@
   <p:clrMapOvr>
     <a:masterClrMapping/>
   </p:clrMapOvr>
-  <mc:AlternateContent xmlns:mc="http://schemas.openxmlformats.org/markup-compatibility/2006">
-    <mc:Choice xmlns:p14="http://schemas.microsoft.com/office/powerpoint/2010/main" Requires="p14">
+  <mc:AlternateContent xmlns:mc="http://schemas.openxmlformats.org/markup-compatibility/2006" xmlns:p14="http://schemas.microsoft.com/office/powerpoint/2010/main">
+    <mc:Choice Requires="p14">
       <p:transition spd="slow" p14:dur="2000"/>
     </mc:Choice>
-    <mc:Fallback>
+    <mc:Fallback xmlns="">
       <p:transition spd="slow"/>
     </mc:Fallback>
   </mc:AlternateContent>
@@ -15556,11 +15538,11 @@
   <p:clrMapOvr>
     <a:masterClrMapping/>
   </p:clrMapOvr>
-  <mc:AlternateContent xmlns:mc="http://schemas.openxmlformats.org/markup-compatibility/2006">
-    <mc:Choice xmlns:p14="http://schemas.microsoft.com/office/powerpoint/2010/main" Requires="p14">
+  <mc:AlternateContent xmlns:mc="http://schemas.openxmlformats.org/markup-compatibility/2006" xmlns:p14="http://schemas.microsoft.com/office/powerpoint/2010/main">
+    <mc:Choice Requires="p14">
       <p:transition spd="slow" p14:dur="2000"/>
     </mc:Choice>
-    <mc:Fallback>
+    <mc:Fallback xmlns="">
       <p:transition spd="slow"/>
     </mc:Fallback>
   </mc:AlternateContent>
@@ -15826,11 +15808,11 @@
   <p:clrMapOvr>
     <a:masterClrMapping/>
   </p:clrMapOvr>
-  <mc:AlternateContent xmlns:mc="http://schemas.openxmlformats.org/markup-compatibility/2006">
-    <mc:Choice xmlns:p14="http://schemas.microsoft.com/office/powerpoint/2010/main" Requires="p14">
+  <mc:AlternateContent xmlns:mc="http://schemas.openxmlformats.org/markup-compatibility/2006" xmlns:p14="http://schemas.microsoft.com/office/powerpoint/2010/main">
+    <mc:Choice Requires="p14">
       <p:transition spd="slow" p14:dur="2000"/>
     </mc:Choice>
-    <mc:Fallback>
+    <mc:Fallback xmlns="">
       <p:transition spd="slow"/>
     </mc:Fallback>
   </mc:AlternateContent>
@@ -15964,11 +15946,11 @@
   <p:clrMapOvr>
     <a:masterClrMapping/>
   </p:clrMapOvr>
-  <mc:AlternateContent xmlns:mc="http://schemas.openxmlformats.org/markup-compatibility/2006">
-    <mc:Choice xmlns:p14="http://schemas.microsoft.com/office/powerpoint/2010/main" Requires="p14">
+  <mc:AlternateContent xmlns:mc="http://schemas.openxmlformats.org/markup-compatibility/2006" xmlns:p14="http://schemas.microsoft.com/office/powerpoint/2010/main">
+    <mc:Choice Requires="p14">
       <p:transition spd="slow" p14:dur="2000"/>
     </mc:Choice>
-    <mc:Fallback>
+    <mc:Fallback xmlns="">
       <p:transition spd="slow"/>
     </mc:Fallback>
   </mc:AlternateContent>
@@ -16063,11 +16045,11 @@
   <p:clrMapOvr>
     <a:masterClrMapping/>
   </p:clrMapOvr>
-  <mc:AlternateContent xmlns:mc="http://schemas.openxmlformats.org/markup-compatibility/2006">
-    <mc:Choice xmlns:p14="http://schemas.microsoft.com/office/powerpoint/2010/main" Requires="p14">
+  <mc:AlternateContent xmlns:mc="http://schemas.openxmlformats.org/markup-compatibility/2006" xmlns:p14="http://schemas.microsoft.com/office/powerpoint/2010/main">
+    <mc:Choice Requires="p14">
       <p:transition spd="slow" p14:dur="2000"/>
     </mc:Choice>
-    <mc:Fallback>
+    <mc:Fallback xmlns="">
       <p:transition spd="slow"/>
     </mc:Fallback>
   </mc:AlternateContent>
@@ -16433,11 +16415,11 @@
   <p:clrMapOvr>
     <a:masterClrMapping/>
   </p:clrMapOvr>
-  <mc:AlternateContent xmlns:mc="http://schemas.openxmlformats.org/markup-compatibility/2006">
-    <mc:Choice xmlns:p14="http://schemas.microsoft.com/office/powerpoint/2010/main" Requires="p14">
+  <mc:AlternateContent xmlns:mc="http://schemas.openxmlformats.org/markup-compatibility/2006" xmlns:p14="http://schemas.microsoft.com/office/powerpoint/2010/main">
+    <mc:Choice Requires="p14">
       <p:transition spd="slow" p14:dur="2000"/>
     </mc:Choice>
-    <mc:Fallback>
+    <mc:Fallback xmlns="">
       <p:transition spd="slow"/>
     </mc:Fallback>
   </mc:AlternateContent>
@@ -16562,11 +16544,11 @@
   <p:clrMapOvr>
     <a:masterClrMapping/>
   </p:clrMapOvr>
-  <mc:AlternateContent xmlns:mc="http://schemas.openxmlformats.org/markup-compatibility/2006">
-    <mc:Choice xmlns:p14="http://schemas.microsoft.com/office/powerpoint/2010/main" Requires="p14">
+  <mc:AlternateContent xmlns:mc="http://schemas.openxmlformats.org/markup-compatibility/2006" xmlns:p14="http://schemas.microsoft.com/office/powerpoint/2010/main">
+    <mc:Choice Requires="p14">
       <p:transition spd="slow" p14:dur="2000"/>
     </mc:Choice>
-    <mc:Fallback>
+    <mc:Fallback xmlns="">
       <p:transition spd="slow"/>
     </mc:Fallback>
   </mc:AlternateContent>
@@ -16703,11 +16685,11 @@
   <p:clrMapOvr>
     <a:masterClrMapping/>
   </p:clrMapOvr>
-  <mc:AlternateContent xmlns:mc="http://schemas.openxmlformats.org/markup-compatibility/2006">
-    <mc:Choice xmlns:p14="http://schemas.microsoft.com/office/powerpoint/2010/main" Requires="p14">
+  <mc:AlternateContent xmlns:mc="http://schemas.openxmlformats.org/markup-compatibility/2006" xmlns:p14="http://schemas.microsoft.com/office/powerpoint/2010/main">
+    <mc:Choice Requires="p14">
       <p:transition spd="slow" p14:dur="2000"/>
     </mc:Choice>
-    <mc:Fallback>
+    <mc:Fallback xmlns="">
       <p:transition spd="slow"/>
     </mc:Fallback>
   </mc:AlternateContent>
@@ -16854,11 +16836,11 @@
   <p:clrMapOvr>
     <a:masterClrMapping/>
   </p:clrMapOvr>
-  <mc:AlternateContent xmlns:mc="http://schemas.openxmlformats.org/markup-compatibility/2006">
-    <mc:Choice xmlns:p14="http://schemas.microsoft.com/office/powerpoint/2010/main" Requires="p14">
+  <mc:AlternateContent xmlns:mc="http://schemas.openxmlformats.org/markup-compatibility/2006" xmlns:p14="http://schemas.microsoft.com/office/powerpoint/2010/main">
+    <mc:Choice Requires="p14">
       <p:transition spd="slow" p14:dur="2000"/>
     </mc:Choice>
-    <mc:Fallback>
+    <mc:Fallback xmlns="">
       <p:transition spd="slow"/>
     </mc:Fallback>
   </mc:AlternateContent>
@@ -17405,11 +17387,11 @@
   <p:clrMapOvr>
     <a:masterClrMapping/>
   </p:clrMapOvr>
-  <mc:AlternateContent xmlns:mc="http://schemas.openxmlformats.org/markup-compatibility/2006">
-    <mc:Choice xmlns:p14="http://schemas.microsoft.com/office/powerpoint/2010/main" Requires="p14">
+  <mc:AlternateContent xmlns:mc="http://schemas.openxmlformats.org/markup-compatibility/2006" xmlns:p14="http://schemas.microsoft.com/office/powerpoint/2010/main">
+    <mc:Choice Requires="p14">
       <p:transition spd="slow" p14:dur="2000"/>
     </mc:Choice>
-    <mc:Fallback>
+    <mc:Fallback xmlns="">
       <p:transition spd="slow"/>
     </mc:Fallback>
   </mc:AlternateContent>

</xml_diff>